<commit_message>
Typo 'aync' changed to 'async'
</commit_message>
<xml_diff>
--- a/PowerPoint Presentation/DDDEastAnglia-AsyncPatterns.pptx
+++ b/PowerPoint Presentation/DDDEastAnglia-AsyncPatterns.pptx
@@ -326,7 +326,7 @@
           <a:p>
             <a:fld id="{062C35B2-88CA-49D3-8E4A-1D75786B8009}" type="datetimeFigureOut">
               <a:rPr lang="en-GB" smtClean="0"/>
-              <a:t>28/06/2013</a:t>
+              <a:t>02/07/2013</a:t>
             </a:fld>
             <a:endParaRPr lang="en-GB"/>
           </a:p>
@@ -496,7 +496,7 @@
           <a:p>
             <a:fld id="{062C35B2-88CA-49D3-8E4A-1D75786B8009}" type="datetimeFigureOut">
               <a:rPr lang="en-GB" smtClean="0"/>
-              <a:t>28/06/2013</a:t>
+              <a:t>02/07/2013</a:t>
             </a:fld>
             <a:endParaRPr lang="en-GB"/>
           </a:p>
@@ -676,7 +676,7 @@
           <a:p>
             <a:fld id="{062C35B2-88CA-49D3-8E4A-1D75786B8009}" type="datetimeFigureOut">
               <a:rPr lang="en-GB" smtClean="0"/>
-              <a:t>28/06/2013</a:t>
+              <a:t>02/07/2013</a:t>
             </a:fld>
             <a:endParaRPr lang="en-GB"/>
           </a:p>
@@ -846,7 +846,7 @@
           <a:p>
             <a:fld id="{062C35B2-88CA-49D3-8E4A-1D75786B8009}" type="datetimeFigureOut">
               <a:rPr lang="en-GB" smtClean="0"/>
-              <a:t>28/06/2013</a:t>
+              <a:t>02/07/2013</a:t>
             </a:fld>
             <a:endParaRPr lang="en-GB"/>
           </a:p>
@@ -1092,7 +1092,7 @@
           <a:p>
             <a:fld id="{062C35B2-88CA-49D3-8E4A-1D75786B8009}" type="datetimeFigureOut">
               <a:rPr lang="en-GB" smtClean="0"/>
-              <a:t>28/06/2013</a:t>
+              <a:t>02/07/2013</a:t>
             </a:fld>
             <a:endParaRPr lang="en-GB"/>
           </a:p>
@@ -1380,7 +1380,7 @@
           <a:p>
             <a:fld id="{062C35B2-88CA-49D3-8E4A-1D75786B8009}" type="datetimeFigureOut">
               <a:rPr lang="en-GB" smtClean="0"/>
-              <a:t>28/06/2013</a:t>
+              <a:t>02/07/2013</a:t>
             </a:fld>
             <a:endParaRPr lang="en-GB"/>
           </a:p>
@@ -1802,7 +1802,7 @@
           <a:p>
             <a:fld id="{062C35B2-88CA-49D3-8E4A-1D75786B8009}" type="datetimeFigureOut">
               <a:rPr lang="en-GB" smtClean="0"/>
-              <a:t>28/06/2013</a:t>
+              <a:t>02/07/2013</a:t>
             </a:fld>
             <a:endParaRPr lang="en-GB"/>
           </a:p>
@@ -1920,7 +1920,7 @@
           <a:p>
             <a:fld id="{062C35B2-88CA-49D3-8E4A-1D75786B8009}" type="datetimeFigureOut">
               <a:rPr lang="en-GB" smtClean="0"/>
-              <a:t>28/06/2013</a:t>
+              <a:t>02/07/2013</a:t>
             </a:fld>
             <a:endParaRPr lang="en-GB"/>
           </a:p>
@@ -2015,7 +2015,7 @@
           <a:p>
             <a:fld id="{062C35B2-88CA-49D3-8E4A-1D75786B8009}" type="datetimeFigureOut">
               <a:rPr lang="en-GB" smtClean="0"/>
-              <a:t>28/06/2013</a:t>
+              <a:t>02/07/2013</a:t>
             </a:fld>
             <a:endParaRPr lang="en-GB"/>
           </a:p>
@@ -2292,7 +2292,7 @@
           <a:p>
             <a:fld id="{062C35B2-88CA-49D3-8E4A-1D75786B8009}" type="datetimeFigureOut">
               <a:rPr lang="en-GB" smtClean="0"/>
-              <a:t>28/06/2013</a:t>
+              <a:t>02/07/2013</a:t>
             </a:fld>
             <a:endParaRPr lang="en-GB"/>
           </a:p>
@@ -2545,7 +2545,7 @@
           <a:p>
             <a:fld id="{062C35B2-88CA-49D3-8E4A-1D75786B8009}" type="datetimeFigureOut">
               <a:rPr lang="en-GB" smtClean="0"/>
-              <a:t>28/06/2013</a:t>
+              <a:t>02/07/2013</a:t>
             </a:fld>
             <a:endParaRPr lang="en-GB"/>
           </a:p>
@@ -2761,7 +2761,7 @@
           <a:p>
             <a:fld id="{062C35B2-88CA-49D3-8E4A-1D75786B8009}" type="datetimeFigureOut">
               <a:rPr lang="en-GB" smtClean="0"/>
-              <a:t>28/06/2013</a:t>
+              <a:t>02/07/2013</a:t>
             </a:fld>
             <a:endParaRPr lang="en-GB"/>
           </a:p>
@@ -6871,21 +6871,8 @@
                   <a:schemeClr val="bg1"/>
                 </a:solidFill>
               </a:rPr>
-              <a:t>- quick </a:t>
-            </a:r>
-            <a:r>
-              <a:rPr lang="en-GB" dirty="0" smtClean="0">
-                <a:solidFill>
-                  <a:schemeClr val="bg1"/>
-                </a:solidFill>
-              </a:rPr>
-              <a:t>recap, 2012 -</a:t>
-            </a:r>
-            <a:endParaRPr lang="en-GB" dirty="0" smtClean="0">
-              <a:solidFill>
-                <a:schemeClr val="bg1"/>
-              </a:solidFill>
-            </a:endParaRPr>
+              <a:t>- quick recap, 2012 -</a:t>
+            </a:r>
           </a:p>
           <a:p>
             <a:r>
@@ -7314,21 +7301,8 @@
                   <a:schemeClr val="bg1"/>
                 </a:solidFill>
               </a:rPr>
-              <a:t>Ending a set of tasks if another tasks ends prematurely (not due to </a:t>
-            </a:r>
-            <a:r>
-              <a:rPr lang="en-GB" sz="3000" dirty="0" smtClean="0">
-                <a:solidFill>
-                  <a:schemeClr val="bg1"/>
-                </a:solidFill>
-              </a:rPr>
-              <a:t>exceptions).</a:t>
-            </a:r>
-            <a:endParaRPr lang="en-GB" sz="3000" dirty="0" smtClean="0">
-              <a:solidFill>
-                <a:schemeClr val="bg1"/>
-              </a:solidFill>
-            </a:endParaRPr>
+              <a:t>Ending a set of tasks if another tasks ends prematurely (not due to exceptions).</a:t>
+            </a:r>
           </a:p>
           <a:p>
             <a:r>
@@ -9220,15 +9194,25 @@
                   <a:schemeClr val="bg1"/>
                 </a:solidFill>
               </a:rPr>
-              <a:t>- </a:t>
-            </a:r>
+              <a:t>- April 2013 -</a:t>
+            </a:r>
+          </a:p>
+          <a:p>
             <a:r>
               <a:rPr lang="en-GB" dirty="0" smtClean="0">
                 <a:solidFill>
                   <a:schemeClr val="bg1"/>
                 </a:solidFill>
               </a:rPr>
-              <a:t>April </a:t>
+              <a:t>Now available Microsoft </a:t>
+            </a:r>
+            <a:r>
+              <a:rPr lang="en-GB" dirty="0" err="1" smtClean="0">
+                <a:solidFill>
+                  <a:schemeClr val="bg1"/>
+                </a:solidFill>
+              </a:rPr>
+              <a:t>Async</a:t>
             </a:r>
             <a:r>
               <a:rPr lang="en-GB" dirty="0" smtClean="0">
@@ -9236,80 +9220,17 @@
                   <a:schemeClr val="bg1"/>
                 </a:solidFill>
               </a:rPr>
-              <a:t>2013</a:t>
-            </a:r>
+              <a:t> BCL </a:t>
+            </a:r>
+          </a:p>
+          <a:p>
             <a:r>
               <a:rPr lang="en-GB" dirty="0" smtClean="0">
                 <a:solidFill>
                   <a:schemeClr val="bg1"/>
                 </a:solidFill>
               </a:rPr>
-              <a:t> </a:t>
-            </a:r>
-            <a:r>
-              <a:rPr lang="en-GB" dirty="0" smtClean="0">
-                <a:solidFill>
-                  <a:schemeClr val="bg1"/>
-                </a:solidFill>
-              </a:rPr>
-              <a:t>-</a:t>
-            </a:r>
-          </a:p>
-          <a:p>
-            <a:r>
-              <a:rPr lang="en-GB" dirty="0" smtClean="0">
-                <a:solidFill>
-                  <a:schemeClr val="bg1"/>
-                </a:solidFill>
-              </a:rPr>
-              <a:t>Now available Microsoft </a:t>
-            </a:r>
-            <a:r>
-              <a:rPr lang="en-GB" dirty="0" err="1" smtClean="0">
-                <a:solidFill>
-                  <a:schemeClr val="bg1"/>
-                </a:solidFill>
-              </a:rPr>
-              <a:t>Async</a:t>
-            </a:r>
-            <a:r>
-              <a:rPr lang="en-GB" dirty="0" smtClean="0">
-                <a:solidFill>
-                  <a:schemeClr val="bg1"/>
-                </a:solidFill>
-              </a:rPr>
-              <a:t> BCL </a:t>
-            </a:r>
-            <a:endParaRPr lang="en-GB" dirty="0" smtClean="0">
-              <a:solidFill>
-                <a:schemeClr val="bg1"/>
-              </a:solidFill>
-            </a:endParaRPr>
-          </a:p>
-          <a:p>
-            <a:r>
-              <a:rPr lang="en-GB" dirty="0" smtClean="0">
-                <a:solidFill>
-                  <a:schemeClr val="bg1"/>
-                </a:solidFill>
-              </a:rPr>
-              <a:t>Requires Visual </a:t>
-            </a:r>
-            <a:r>
-              <a:rPr lang="en-GB" dirty="0" smtClean="0">
-                <a:solidFill>
-                  <a:schemeClr val="bg1"/>
-                </a:solidFill>
-              </a:rPr>
-              <a:t>Studio </a:t>
-            </a:r>
-            <a:r>
-              <a:rPr lang="en-GB" dirty="0" smtClean="0">
-                <a:solidFill>
-                  <a:schemeClr val="bg1"/>
-                </a:solidFill>
-              </a:rPr>
-              <a:t>2012 but can target </a:t>
+              <a:t>Requires Visual Studio 2012 but can target </a:t>
             </a:r>
             <a:r>
               <a:rPr lang="en-GB" dirty="0" err="1" smtClean="0">
@@ -10463,12 +10384,12 @@
               <a:t>Possible to include more than one await within a single </a:t>
             </a:r>
             <a:r>
-              <a:rPr lang="en-GB" dirty="0" err="1" smtClean="0">
-                <a:solidFill>
-                  <a:schemeClr val="bg1"/>
-                </a:solidFill>
-              </a:rPr>
-              <a:t>aync</a:t>
+              <a:rPr lang="en-GB" smtClean="0">
+                <a:solidFill>
+                  <a:schemeClr val="bg1"/>
+                </a:solidFill>
+              </a:rPr>
+              <a:t>async</a:t>
             </a:r>
             <a:r>
               <a:rPr lang="en-GB" dirty="0" smtClean="0">
@@ -10476,7 +10397,15 @@
                   <a:schemeClr val="bg1"/>
                 </a:solidFill>
               </a:rPr>
-              <a:t> method</a:t>
+              <a:t> </a:t>
+            </a:r>
+            <a:r>
+              <a:rPr lang="en-GB" dirty="0" smtClean="0">
+                <a:solidFill>
+                  <a:schemeClr val="bg1"/>
+                </a:solidFill>
+              </a:rPr>
+              <a:t>method</a:t>
             </a:r>
             <a:endParaRPr lang="en-GB" dirty="0">
               <a:solidFill>
@@ -11106,16 +11035,23 @@
                 </a:solidFill>
                 <a:latin typeface="Courier New" pitchFamily="49" charset="0"/>
               </a:rPr>
-              <a:t>Task&lt;T</a:t>
+              <a:t>Task&lt;T&gt;</a:t>
             </a:r>
             <a:r>
               <a:rPr lang="en-GB" dirty="0" smtClean="0">
                 <a:solidFill>
                   <a:schemeClr val="bg1"/>
                 </a:solidFill>
-                <a:latin typeface="Courier New" pitchFamily="49" charset="0"/>
-              </a:rPr>
-              <a:t>&gt;</a:t>
+              </a:rPr>
+              <a:t> means we not only receive a return value, we can obtain additional information about the task performed by the </a:t>
+            </a:r>
+            <a:r>
+              <a:rPr lang="en-GB" dirty="0" err="1" smtClean="0">
+                <a:solidFill>
+                  <a:schemeClr val="bg1"/>
+                </a:solidFill>
+              </a:rPr>
+              <a:t>async</a:t>
             </a:r>
             <a:r>
               <a:rPr lang="en-GB" dirty="0" smtClean="0">
@@ -11123,31 +11059,7 @@
                   <a:schemeClr val="bg1"/>
                 </a:solidFill>
               </a:rPr>
-              <a:t> means we not only receive a return value, we can obtain additional information about the task performed by the </a:t>
-            </a:r>
-            <a:r>
-              <a:rPr lang="en-GB" dirty="0" err="1" smtClean="0">
-                <a:solidFill>
-                  <a:schemeClr val="bg1"/>
-                </a:solidFill>
-              </a:rPr>
-              <a:t>async</a:t>
-            </a:r>
-            <a:r>
-              <a:rPr lang="en-GB" dirty="0" smtClean="0">
-                <a:solidFill>
-                  <a:schemeClr val="bg1"/>
-                </a:solidFill>
-              </a:rPr>
-              <a:t> method, including detecting </a:t>
-            </a:r>
-            <a:r>
-              <a:rPr lang="en-GB" dirty="0" smtClean="0">
-                <a:solidFill>
-                  <a:schemeClr val="bg1"/>
-                </a:solidFill>
-              </a:rPr>
-              <a:t>completion and handling exceptions.</a:t>
+              <a:t> method, including detecting completion and handling exceptions.</a:t>
             </a:r>
             <a:endParaRPr lang="en-GB" dirty="0">
               <a:solidFill>

</xml_diff>